<commit_message>
Changes in relevant report and presentations
</commit_message>
<xml_diff>
--- a/group11.pptx
+++ b/group11.pptx
@@ -30,8 +30,13 @@
     <p:sldId id="284" r:id="rId24"/>
     <p:sldId id="286" r:id="rId25"/>
     <p:sldId id="277" r:id="rId26"/>
-    <p:sldId id="278" r:id="rId27"/>
-    <p:sldId id="279" r:id="rId28"/>
+    <p:sldId id="288" r:id="rId27"/>
+    <p:sldId id="287" r:id="rId28"/>
+    <p:sldId id="289" r:id="rId29"/>
+    <p:sldId id="292" r:id="rId30"/>
+    <p:sldId id="293" r:id="rId31"/>
+    <p:sldId id="278" r:id="rId32"/>
+    <p:sldId id="279" r:id="rId33"/>
   </p:sldIdLst>
   <p:sldSz cx="9144000" cy="6858000" type="screen4x3"/>
   <p:notesSz cx="6858000" cy="9144000"/>
@@ -585,11 +590,11 @@
           <c:showPercent val="0"/>
           <c:showBubbleSize val="0"/>
         </c:dLbls>
-        <c:axId val="44565248"/>
-        <c:axId val="44638976"/>
+        <c:axId val="52675712"/>
+        <c:axId val="52677632"/>
       </c:scatterChart>
       <c:valAx>
-        <c:axId val="44565248"/>
+        <c:axId val="52675712"/>
         <c:scaling>
           <c:orientation val="minMax"/>
         </c:scaling>
@@ -618,12 +623,12 @@
         <c:majorTickMark val="out"/>
         <c:minorTickMark val="none"/>
         <c:tickLblPos val="nextTo"/>
-        <c:crossAx val="44638976"/>
+        <c:crossAx val="52677632"/>
         <c:crosses val="autoZero"/>
         <c:crossBetween val="midCat"/>
       </c:valAx>
       <c:valAx>
-        <c:axId val="44638976"/>
+        <c:axId val="52677632"/>
         <c:scaling>
           <c:orientation val="minMax"/>
         </c:scaling>
@@ -653,7 +658,7 @@
         <c:majorTickMark val="out"/>
         <c:minorTickMark val="none"/>
         <c:tickLblPos val="nextTo"/>
-        <c:crossAx val="44565248"/>
+        <c:crossAx val="52675712"/>
         <c:crosses val="autoZero"/>
         <c:crossBetween val="midCat"/>
       </c:valAx>
@@ -1125,11 +1130,11 @@
           <c:showPercent val="0"/>
           <c:showBubbleSize val="0"/>
         </c:dLbls>
-        <c:axId val="44692608"/>
-        <c:axId val="44785024"/>
+        <c:axId val="70366336"/>
+        <c:axId val="70368256"/>
       </c:scatterChart>
       <c:valAx>
-        <c:axId val="44692608"/>
+        <c:axId val="70366336"/>
         <c:scaling>
           <c:orientation val="minMax"/>
         </c:scaling>
@@ -1158,12 +1163,12 @@
         <c:majorTickMark val="out"/>
         <c:minorTickMark val="none"/>
         <c:tickLblPos val="nextTo"/>
-        <c:crossAx val="44785024"/>
+        <c:crossAx val="70368256"/>
         <c:crosses val="autoZero"/>
         <c:crossBetween val="midCat"/>
       </c:valAx>
       <c:valAx>
-        <c:axId val="44785024"/>
+        <c:axId val="70368256"/>
         <c:scaling>
           <c:orientation val="minMax"/>
         </c:scaling>
@@ -1193,7 +1198,7 @@
         <c:majorTickMark val="out"/>
         <c:minorTickMark val="none"/>
         <c:tickLblPos val="nextTo"/>
-        <c:crossAx val="44692608"/>
+        <c:crossAx val="70366336"/>
         <c:crosses val="autoZero"/>
         <c:crossBetween val="midCat"/>
       </c:valAx>
@@ -1665,11 +1670,11 @@
           <c:showPercent val="0"/>
           <c:showBubbleSize val="0"/>
         </c:dLbls>
-        <c:axId val="44645376"/>
-        <c:axId val="44781568"/>
+        <c:axId val="52892800"/>
+        <c:axId val="52894720"/>
       </c:scatterChart>
       <c:valAx>
-        <c:axId val="44645376"/>
+        <c:axId val="52892800"/>
         <c:scaling>
           <c:orientation val="minMax"/>
         </c:scaling>
@@ -1698,12 +1703,12 @@
         <c:majorTickMark val="out"/>
         <c:minorTickMark val="none"/>
         <c:tickLblPos val="nextTo"/>
-        <c:crossAx val="44781568"/>
+        <c:crossAx val="52894720"/>
         <c:crosses val="autoZero"/>
         <c:crossBetween val="midCat"/>
       </c:valAx>
       <c:valAx>
-        <c:axId val="44781568"/>
+        <c:axId val="52894720"/>
         <c:scaling>
           <c:orientation val="minMax"/>
         </c:scaling>
@@ -1733,7 +1738,7 @@
         <c:majorTickMark val="out"/>
         <c:minorTickMark val="none"/>
         <c:tickLblPos val="nextTo"/>
-        <c:crossAx val="44645376"/>
+        <c:crossAx val="52892800"/>
         <c:crosses val="autoZero"/>
         <c:crossBetween val="midCat"/>
       </c:valAx>
@@ -2205,11 +2210,11 @@
           <c:showPercent val="0"/>
           <c:showBubbleSize val="0"/>
         </c:dLbls>
-        <c:axId val="47288320"/>
-        <c:axId val="47290240"/>
+        <c:axId val="52936704"/>
+        <c:axId val="52938624"/>
       </c:scatterChart>
       <c:valAx>
-        <c:axId val="47288320"/>
+        <c:axId val="52936704"/>
         <c:scaling>
           <c:orientation val="minMax"/>
         </c:scaling>
@@ -2238,12 +2243,12 @@
         <c:majorTickMark val="out"/>
         <c:minorTickMark val="none"/>
         <c:tickLblPos val="nextTo"/>
-        <c:crossAx val="47290240"/>
+        <c:crossAx val="52938624"/>
         <c:crosses val="autoZero"/>
         <c:crossBetween val="midCat"/>
       </c:valAx>
       <c:valAx>
-        <c:axId val="47290240"/>
+        <c:axId val="52938624"/>
         <c:scaling>
           <c:orientation val="minMax"/>
         </c:scaling>
@@ -2273,7 +2278,7 @@
         <c:majorTickMark val="out"/>
         <c:minorTickMark val="none"/>
         <c:tickLblPos val="nextTo"/>
-        <c:crossAx val="47288320"/>
+        <c:crossAx val="52936704"/>
         <c:crosses val="autoZero"/>
         <c:crossBetween val="midCat"/>
       </c:valAx>
@@ -2745,11 +2750,11 @@
           <c:showPercent val="0"/>
           <c:showBubbleSize val="0"/>
         </c:dLbls>
-        <c:axId val="44550016"/>
-        <c:axId val="44572032"/>
+        <c:axId val="52851072"/>
+        <c:axId val="52852992"/>
       </c:scatterChart>
       <c:valAx>
-        <c:axId val="44550016"/>
+        <c:axId val="52851072"/>
         <c:scaling>
           <c:orientation val="minMax"/>
         </c:scaling>
@@ -2778,12 +2783,12 @@
         <c:majorTickMark val="out"/>
         <c:minorTickMark val="none"/>
         <c:tickLblPos val="nextTo"/>
-        <c:crossAx val="44572032"/>
+        <c:crossAx val="52852992"/>
         <c:crosses val="autoZero"/>
         <c:crossBetween val="midCat"/>
       </c:valAx>
       <c:valAx>
-        <c:axId val="44572032"/>
+        <c:axId val="52852992"/>
         <c:scaling>
           <c:orientation val="minMax"/>
         </c:scaling>
@@ -2813,7 +2818,7 @@
         <c:majorTickMark val="out"/>
         <c:minorTickMark val="none"/>
         <c:tickLblPos val="nextTo"/>
-        <c:crossAx val="44550016"/>
+        <c:crossAx val="52851072"/>
         <c:crosses val="autoZero"/>
         <c:crossBetween val="midCat"/>
       </c:valAx>
@@ -3285,11 +3290,11 @@
           <c:showPercent val="0"/>
           <c:showBubbleSize val="0"/>
         </c:dLbls>
-        <c:axId val="44586880"/>
-        <c:axId val="46361600"/>
+        <c:axId val="53285632"/>
+        <c:axId val="53287552"/>
       </c:scatterChart>
       <c:valAx>
-        <c:axId val="44586880"/>
+        <c:axId val="53285632"/>
         <c:scaling>
           <c:orientation val="minMax"/>
         </c:scaling>
@@ -3318,12 +3323,12 @@
         <c:majorTickMark val="out"/>
         <c:minorTickMark val="none"/>
         <c:tickLblPos val="nextTo"/>
-        <c:crossAx val="46361600"/>
+        <c:crossAx val="53287552"/>
         <c:crosses val="autoZero"/>
         <c:crossBetween val="midCat"/>
       </c:valAx>
       <c:valAx>
-        <c:axId val="46361600"/>
+        <c:axId val="53287552"/>
         <c:scaling>
           <c:orientation val="minMax"/>
         </c:scaling>
@@ -3353,7 +3358,7 @@
         <c:majorTickMark val="out"/>
         <c:minorTickMark val="none"/>
         <c:tickLblPos val="nextTo"/>
-        <c:crossAx val="44586880"/>
+        <c:crossAx val="53285632"/>
         <c:crosses val="autoZero"/>
         <c:crossBetween val="midCat"/>
       </c:valAx>
@@ -8325,10 +8330,6 @@
               <a:rPr lang="en-US" dirty="0" smtClean="0"/>
               <a:t>CL-716</a:t>
             </a:r>
-            <a:r>
-              <a:rPr lang="en-US" dirty="0" smtClean="0"/>
-              <a:t/>
-            </a:r>
             <a:br>
               <a:rPr lang="en-US" dirty="0" smtClean="0"/>
             </a:br>
@@ -8339,10 +8340,6 @@
             <a:r>
               <a:rPr lang="en-US" dirty="0" smtClean="0"/>
               <a:t>Biological Patterns</a:t>
-            </a:r>
-            <a:r>
-              <a:rPr lang="en-US" dirty="0" smtClean="0"/>
-              <a:t/>
             </a:r>
             <a:br>
               <a:rPr lang="en-US" dirty="0" smtClean="0"/>
@@ -8382,29 +8379,19 @@
               <a:rPr lang="en-US" sz="2100" dirty="0" smtClean="0"/>
               <a:t>Project Presentation</a:t>
             </a:r>
-            <a:endParaRPr lang="en-US" sz="2100" dirty="0" smtClean="0"/>
           </a:p>
           <a:p>
             <a:pPr algn="ctr"/>
             <a:r>
               <a:rPr lang="en-US" sz="2100" dirty="0" smtClean="0"/>
-              <a:t>Group </a:t>
-            </a:r>
+              <a:t>Group 11</a:t>
+            </a:r>
+          </a:p>
+          <a:p>
+            <a:pPr algn="ctr"/>
             <a:r>
               <a:rPr lang="en-US" sz="2100" dirty="0" smtClean="0"/>
-              <a:t>11</a:t>
-            </a:r>
-            <a:endParaRPr lang="en-US" sz="2100" dirty="0" smtClean="0"/>
-          </a:p>
-          <a:p>
-            <a:pPr algn="ctr"/>
-            <a:r>
-              <a:rPr lang="en-US" sz="2100" dirty="0" smtClean="0"/>
-              <a:t>Date: </a:t>
-            </a:r>
-            <a:r>
-              <a:rPr lang="en-US" sz="2100" dirty="0" smtClean="0"/>
-              <a:t>16</a:t>
+              <a:t>Date: 16</a:t>
             </a:r>
             <a:r>
               <a:rPr lang="en-US" sz="2100" baseline="30000" dirty="0" smtClean="0"/>
@@ -8412,11 +8399,7 @@
             </a:r>
             <a:r>
               <a:rPr lang="en-US" sz="2100" dirty="0" smtClean="0"/>
-              <a:t> </a:t>
-            </a:r>
-            <a:r>
-              <a:rPr lang="en-US" sz="2100" dirty="0" smtClean="0"/>
-              <a:t>Apr 2015</a:t>
+              <a:t> Apr 2015</a:t>
             </a:r>
           </a:p>
           <a:p>
@@ -8437,7 +8420,6 @@
               <a:rPr lang="en-US" dirty="0" smtClean="0"/>
               <a:t>                     </a:t>
             </a:r>
-            <a:endParaRPr lang="en-US" dirty="0" smtClean="0"/>
           </a:p>
           <a:p>
             <a:pPr algn="r"/>
@@ -8449,23 +8431,13 @@
               <a:rPr lang="en-US" dirty="0" smtClean="0"/>
               <a:t>)</a:t>
             </a:r>
-            <a:endParaRPr lang="en-US" dirty="0" smtClean="0"/>
           </a:p>
           <a:p>
             <a:pPr algn="r"/>
             <a:r>
               <a:rPr lang="en-US" dirty="0" smtClean="0"/>
-              <a:t>Amit  </a:t>
-            </a:r>
-            <a:r>
-              <a:rPr lang="en-US" dirty="0" smtClean="0"/>
-              <a:t>Agarwal (11D020014</a:t>
-            </a:r>
-            <a:r>
-              <a:rPr lang="en-US" dirty="0" smtClean="0"/>
-              <a:t>)</a:t>
-            </a:r>
-            <a:endParaRPr lang="en-US" dirty="0" smtClean="0"/>
+              <a:t>Amit  Agarwal (11D020014)</a:t>
+            </a:r>
           </a:p>
         </p:txBody>
       </p:sp>
@@ -9093,7 +9065,6 @@
               <a:rPr lang="en-US" sz="2000" dirty="0"/>
               <a:t>A = 2 and B = 3.7 for zero flux boundary condition</a:t>
             </a:r>
-            <a:endParaRPr lang="en-US" sz="2000" dirty="0"/>
           </a:p>
         </p:txBody>
       </p:sp>
@@ -9188,7 +9159,6 @@
               <a:rPr lang="en-US" sz="1400" dirty="0"/>
               <a:t>vs distance ‘r’ and time ‘t’</a:t>
             </a:r>
-            <a:endParaRPr lang="en-US" sz="1400" dirty="0"/>
           </a:p>
         </p:txBody>
       </p:sp>
@@ -9219,7 +9189,6 @@
               <a:rPr lang="en-US" sz="1400" dirty="0"/>
               <a:t>X vs distance ‘r’ and time ‘t’</a:t>
             </a:r>
-            <a:endParaRPr lang="en-US" sz="1400" dirty="0"/>
           </a:p>
         </p:txBody>
       </p:sp>
@@ -9363,7 +9332,6 @@
               <a:rPr lang="en-US" sz="2000" dirty="0"/>
               <a:t>A = 2 and B = 3.7 for zero flux boundary condition</a:t>
             </a:r>
-            <a:endParaRPr lang="en-US" sz="2000" dirty="0"/>
           </a:p>
         </p:txBody>
       </p:sp>
@@ -9458,7 +9426,6 @@
               <a:rPr lang="en-US" sz="1400" dirty="0"/>
               <a:t>vs distance ‘r’ and time ‘t’</a:t>
             </a:r>
-            <a:endParaRPr lang="en-US" sz="1400" dirty="0"/>
           </a:p>
         </p:txBody>
       </p:sp>
@@ -9489,7 +9456,6 @@
               <a:rPr lang="en-US" sz="1400" dirty="0"/>
               <a:t>X vs distance ‘r’ and time ‘t’</a:t>
             </a:r>
-            <a:endParaRPr lang="en-US" sz="1400" dirty="0"/>
           </a:p>
         </p:txBody>
       </p:sp>
@@ -10158,7 +10124,6 @@
               <a:rPr lang="en-US" dirty="0"/>
               <a:t>The theoretical expressions are limited to the neighborhood of the marginal stability point.  Computer simulations  allow not  only the  verification  of their predictions but  also  the  investigation of  the  behavior  of  the  system  for  larger  deviations  from  the instability point.</a:t>
             </a:r>
-            <a:endParaRPr lang="en-US" dirty="0"/>
           </a:p>
         </p:txBody>
       </p:sp>
@@ -11296,7 +11261,6 @@
               <a:rPr lang="en-US" dirty="0"/>
               <a:t>8 (same)</a:t>
             </a:r>
-            <a:endParaRPr lang="en-US" dirty="0"/>
           </a:p>
         </p:txBody>
       </p:sp>
@@ -11347,7 +11311,7 @@
           <a:p>
             <a:r>
               <a:rPr lang="en-US" dirty="0" smtClean="0"/>
-              <a:t>References</a:t>
+              <a:t>Extended Analysis</a:t>
             </a:r>
             <a:endParaRPr lang="en-US" dirty="0"/>
           </a:p>
@@ -11355,116 +11319,66 @@
       </p:sp>
       <p:sp>
         <p:nvSpPr>
-          <p:cNvPr id="3" name="Content Placeholder 2"/>
+          <p:cNvPr id="3" name="Text Placeholder 2"/>
           <p:cNvSpPr>
             <a:spLocks noGrp="1"/>
           </p:cNvSpPr>
           <p:nvPr>
-            <p:ph sz="quarter" idx="1"/>
+            <p:ph type="body" idx="1"/>
           </p:nvPr>
         </p:nvSpPr>
         <p:spPr/>
         <p:txBody>
-          <a:bodyPr>
-            <a:normAutofit fontScale="92500"/>
-          </a:bodyPr>
-          <a:lstStyle/>
-          <a:p>
-            <a:r>
-              <a:rPr lang="en-US" b="1" dirty="0"/>
-              <a:t>J. F. G. </a:t>
-            </a:r>
-            <a:r>
-              <a:rPr lang="en-US" b="1" dirty="0" err="1"/>
-              <a:t>Auchmuty</a:t>
-            </a:r>
-            <a:r>
-              <a:rPr lang="en-US" b="1" dirty="0"/>
-              <a:t> and </a:t>
-            </a:r>
-            <a:r>
-              <a:rPr lang="en-US" b="1" dirty="0" err="1"/>
-              <a:t>Nicholis</a:t>
-            </a:r>
-            <a:r>
-              <a:rPr lang="en-US" b="1" dirty="0"/>
-              <a:t> G.</a:t>
+          <a:bodyPr/>
+          <a:lstStyle/>
+          <a:p>
+            <a:pPr marL="285750" indent="-285750">
+              <a:buFontTx/>
+              <a:buChar char="-"/>
+            </a:pPr>
+            <a:r>
+              <a:rPr lang="en-US" dirty="0" smtClean="0"/>
+              <a:t>Analytical </a:t>
             </a:r>
             <a:r>
               <a:rPr lang="en-US" dirty="0"/>
-              <a:t> Bifurcation analysis of Nonlinear Reaction-Diffusion Equations - I [Journal]. - [</a:t>
-            </a:r>
-            <a:r>
-              <a:rPr lang="en-US" dirty="0" err="1"/>
-              <a:t>s.l</a:t>
-            </a:r>
+              <a:t>steady state dissipative </a:t>
+            </a:r>
+            <a:r>
+              <a:rPr lang="en-US" dirty="0" smtClean="0"/>
+              <a:t>structure</a:t>
+            </a:r>
+          </a:p>
+          <a:p>
+            <a:pPr marL="285750" indent="-285750">
+              <a:buFontTx/>
+              <a:buChar char="-"/>
+            </a:pPr>
             <a:r>
               <a:rPr lang="en-US" dirty="0"/>
-              <a:t>.] : Bull. Math. Biology, 1974. - Vol. 37</a:t>
+              <a:t>Properties of the Dissipative </a:t>
             </a:r>
             <a:r>
               <a:rPr lang="en-US" dirty="0" smtClean="0"/>
-              <a:t>.</a:t>
-            </a:r>
-            <a:endParaRPr lang="en-US" dirty="0"/>
-          </a:p>
-          <a:p>
-            <a:r>
-              <a:rPr lang="en-US" b="1" dirty="0"/>
-              <a:t>Kaufman M. Herschkowitz</a:t>
-            </a:r>
-            <a:r>
-              <a:rPr lang="en-US" dirty="0"/>
-              <a:t> Bifurcation analysis of non-linear reaction-diffusion equations - II [Journal]. - Belgium : [</a:t>
-            </a:r>
-            <a:r>
-              <a:rPr lang="en-US" dirty="0" err="1"/>
-              <a:t>s.n</a:t>
-            </a:r>
-            <a:r>
-              <a:rPr lang="en-US" dirty="0"/>
-              <a:t>.], 1975. - Vol. 37.</a:t>
-            </a:r>
-          </a:p>
-          <a:p>
-            <a:r>
-              <a:rPr lang="en-US" b="1" dirty="0"/>
-              <a:t>Murray J. D.</a:t>
-            </a:r>
-            <a:r>
-              <a:rPr lang="en-US" dirty="0"/>
-              <a:t> Mathematical Biology [Book]. - Vol. II.</a:t>
-            </a:r>
-          </a:p>
-          <a:p>
-            <a:r>
-              <a:rPr lang="en-US" b="1" dirty="0"/>
-              <a:t>Solving Initial-Boundary value problems for parabolic-elliptic PDEs in 1-D</a:t>
-            </a:r>
-            <a:r>
-              <a:rPr lang="en-US" dirty="0"/>
-              <a:t> [Online] // </a:t>
-            </a:r>
-            <a:r>
-              <a:rPr lang="en-US" dirty="0" err="1"/>
-              <a:t>Mathworks</a:t>
-            </a:r>
-            <a:r>
-              <a:rPr lang="en-US" dirty="0"/>
-              <a:t> India. - http://in.mathworks.com/help/matlab/ref/pdepe.html</a:t>
-            </a:r>
+              <a:t>Structure</a:t>
+            </a:r>
+          </a:p>
+          <a:p>
+            <a:pPr marL="285750" indent="-285750">
+              <a:buFontTx/>
+              <a:buChar char="-"/>
+            </a:pPr>
             <a:r>
               <a:rPr lang="en-US" dirty="0" smtClean="0"/>
-              <a:t>.</a:t>
-            </a:r>
-            <a:endParaRPr lang="en-US" dirty="0"/>
+              <a:t>Matlab code</a:t>
+            </a:r>
           </a:p>
         </p:txBody>
       </p:sp>
     </p:spTree>
     <p:extLst>
       <p:ext uri="{BB962C8B-B14F-4D97-AF65-F5344CB8AC3E}">
-        <p14:creationId xmlns:p14="http://schemas.microsoft.com/office/powerpoint/2010/main" val="1588986807"/>
+        <p14:creationId xmlns:p14="http://schemas.microsoft.com/office/powerpoint/2010/main" val="2429545602"/>
       </p:ext>
     </p:extLst>
   </p:cSld>
@@ -11501,29 +11415,475 @@
             <p:ph type="title"/>
           </p:nvPr>
         </p:nvSpPr>
+        <p:spPr/>
+        <p:txBody>
+          <a:bodyPr/>
+          <a:lstStyle/>
+          <a:p>
+            <a:r>
+              <a:rPr lang="en-US" sz="3200" dirty="0">
+                <a:ea typeface="Calibri"/>
+                <a:cs typeface="Courier New"/>
+              </a:rPr>
+              <a:t>Analytical steady state dissipative structure</a:t>
+            </a:r>
+            <a:endParaRPr lang="en-US" sz="3200" dirty="0"/>
+          </a:p>
+        </p:txBody>
+      </p:sp>
+      <p:sp>
+        <p:nvSpPr>
+          <p:cNvPr id="3" name="Content Placeholder 2"/>
+          <p:cNvSpPr>
+            <a:spLocks noGrp="1"/>
+          </p:cNvSpPr>
+          <p:nvPr>
+            <p:ph sz="quarter" idx="1"/>
+          </p:nvPr>
+        </p:nvSpPr>
+        <p:spPr/>
+        <p:txBody>
+          <a:bodyPr>
+            <a:normAutofit/>
+          </a:bodyPr>
+          <a:lstStyle/>
+          <a:p>
+            <a:r>
+              <a:rPr lang="en-US" sz="2000" dirty="0"/>
+              <a:t>We have</a:t>
+            </a:r>
+            <a:r>
+              <a:rPr lang="en-US" sz="2000" dirty="0" smtClean="0"/>
+              <a:t>,</a:t>
+            </a:r>
+          </a:p>
+          <a:p>
+            <a:endParaRPr lang="en-US" sz="2000" dirty="0"/>
+          </a:p>
+        </p:txBody>
+      </p:sp>
+      <p:pic>
+        <p:nvPicPr>
+          <p:cNvPr id="4" name="Picture 3"/>
+          <p:cNvPicPr/>
+          <p:nvPr/>
+        </p:nvPicPr>
+        <p:blipFill>
+          <a:blip r:embed="rId2">
+            <a:extLst>
+              <a:ext uri="{28A0092B-C50C-407E-A947-70E740481C1C}">
+                <a14:useLocalDpi xmlns:a14="http://schemas.microsoft.com/office/drawing/2010/main" val="0"/>
+              </a:ext>
+            </a:extLst>
+          </a:blip>
+          <a:stretch>
+            <a:fillRect/>
+          </a:stretch>
+        </p:blipFill>
         <p:spPr>
           <a:xfrm>
-            <a:off x="457200" y="2590800"/>
-            <a:ext cx="7467600" cy="1143000"/>
+            <a:off x="533400" y="1905000"/>
+            <a:ext cx="7391400" cy="1295400"/>
           </a:xfrm>
+          <a:prstGeom prst="rect">
+            <a:avLst/>
+          </a:prstGeom>
         </p:spPr>
-        <p:txBody>
-          <a:bodyPr/>
-          <a:lstStyle/>
-          <a:p>
-            <a:pPr algn="ctr"/>
-            <a:r>
-              <a:rPr lang="en-US" dirty="0" smtClean="0"/>
-              <a:t>Thank You</a:t>
+      </p:pic>
+      <p:sp>
+        <p:nvSpPr>
+          <p:cNvPr id="5" name="Rectangle 4"/>
+          <p:cNvSpPr/>
+          <p:nvPr/>
+        </p:nvSpPr>
+        <p:spPr>
+          <a:xfrm>
+            <a:off x="533400" y="3243330"/>
+            <a:ext cx="7391400" cy="646331"/>
+          </a:xfrm>
+          <a:prstGeom prst="rect">
+            <a:avLst/>
+          </a:prstGeom>
+        </p:spPr>
+        <p:txBody>
+          <a:bodyPr wrap="square">
+            <a:spAutoFit/>
+          </a:bodyPr>
+          <a:lstStyle/>
+          <a:p>
+            <a:r>
+              <a:rPr lang="en-US" dirty="0"/>
+              <a:t>The  bifurcating  non  uniform  steady  state  solution  near  B  =  </a:t>
+            </a:r>
+            <a:r>
+              <a:rPr lang="en-US" dirty="0" err="1"/>
+              <a:t>B</a:t>
+            </a:r>
+            <a:r>
+              <a:rPr lang="en-US" baseline="-25000" dirty="0" err="1"/>
+              <a:t>c</a:t>
+            </a:r>
+            <a:r>
+              <a:rPr lang="en-US" dirty="0"/>
+              <a:t>  is  thus  approximated  by:</a:t>
             </a:r>
             <a:endParaRPr lang="en-US" dirty="0"/>
           </a:p>
         </p:txBody>
       </p:sp>
+      <p:pic>
+        <p:nvPicPr>
+          <p:cNvPr id="6" name="Picture 5"/>
+          <p:cNvPicPr/>
+          <p:nvPr/>
+        </p:nvPicPr>
+        <p:blipFill>
+          <a:blip r:embed="rId3">
+            <a:extLst>
+              <a:ext uri="{28A0092B-C50C-407E-A947-70E740481C1C}">
+                <a14:useLocalDpi xmlns:a14="http://schemas.microsoft.com/office/drawing/2010/main" val="0"/>
+              </a:ext>
+            </a:extLst>
+          </a:blip>
+          <a:stretch>
+            <a:fillRect/>
+          </a:stretch>
+        </p:blipFill>
+        <p:spPr>
+          <a:xfrm>
+            <a:off x="533400" y="4001770"/>
+            <a:ext cx="7391400" cy="2627630"/>
+          </a:xfrm>
+          <a:prstGeom prst="rect">
+            <a:avLst/>
+          </a:prstGeom>
+        </p:spPr>
+      </p:pic>
     </p:spTree>
     <p:extLst>
       <p:ext uri="{BB962C8B-B14F-4D97-AF65-F5344CB8AC3E}">
-        <p14:creationId xmlns:p14="http://schemas.microsoft.com/office/powerpoint/2010/main" val="1753446294"/>
+        <p14:creationId xmlns:p14="http://schemas.microsoft.com/office/powerpoint/2010/main" val="2257412575"/>
+      </p:ext>
+    </p:extLst>
+  </p:cSld>
+  <p:clrMapOvr>
+    <a:masterClrMapping/>
+  </p:clrMapOvr>
+</p:sld>
+</file>
+
+<file path=ppt/slides/slide28.xml><?xml version="1.0" encoding="utf-8"?>
+<p:sld xmlns:a="http://schemas.openxmlformats.org/drawingml/2006/main" xmlns:r="http://schemas.openxmlformats.org/officeDocument/2006/relationships" xmlns:p="http://schemas.openxmlformats.org/presentationml/2006/main">
+  <p:cSld>
+    <p:spTree>
+      <p:nvGrpSpPr>
+        <p:cNvPr id="1" name=""/>
+        <p:cNvGrpSpPr/>
+        <p:nvPr/>
+      </p:nvGrpSpPr>
+      <p:grpSpPr>
+        <a:xfrm>
+          <a:off x="0" y="0"/>
+          <a:ext cx="0" cy="0"/>
+          <a:chOff x="0" y="0"/>
+          <a:chExt cx="0" cy="0"/>
+        </a:xfrm>
+      </p:grpSpPr>
+      <p:sp>
+        <p:nvSpPr>
+          <p:cNvPr id="2" name="Title 1"/>
+          <p:cNvSpPr>
+            <a:spLocks noGrp="1"/>
+          </p:cNvSpPr>
+          <p:nvPr>
+            <p:ph type="title"/>
+          </p:nvPr>
+        </p:nvSpPr>
+        <p:spPr/>
+        <p:txBody>
+          <a:bodyPr/>
+          <a:lstStyle/>
+          <a:p>
+            <a:r>
+              <a:rPr lang="en-US" dirty="0" smtClean="0"/>
+              <a:t>Matlab Code</a:t>
+            </a:r>
+            <a:endParaRPr lang="en-US" dirty="0"/>
+          </a:p>
+        </p:txBody>
+      </p:sp>
+      <p:pic>
+        <p:nvPicPr>
+          <p:cNvPr id="1026" name="Picture 2"/>
+          <p:cNvPicPr>
+            <a:picLocks noGrp="1" noChangeAspect="1" noChangeArrowheads="1"/>
+          </p:cNvPicPr>
+          <p:nvPr>
+            <p:ph sz="quarter" idx="1"/>
+          </p:nvPr>
+        </p:nvPicPr>
+        <p:blipFill>
+          <a:blip r:embed="rId2" cstate="print">
+            <a:extLst>
+              <a:ext uri="{28A0092B-C50C-407E-A947-70E740481C1C}">
+                <a14:useLocalDpi xmlns:a14="http://schemas.microsoft.com/office/drawing/2010/main" val="0"/>
+              </a:ext>
+            </a:extLst>
+          </a:blip>
+          <a:srcRect/>
+          <a:stretch>
+            <a:fillRect/>
+          </a:stretch>
+        </p:blipFill>
+        <p:spPr bwMode="auto">
+          <a:xfrm>
+            <a:off x="762000" y="1676400"/>
+            <a:ext cx="6629912" cy="4911846"/>
+          </a:xfrm>
+          <a:prstGeom prst="rect">
+            <a:avLst/>
+          </a:prstGeom>
+          <a:noFill/>
+          <a:ln>
+            <a:noFill/>
+          </a:ln>
+          <a:effectLst/>
+          <a:extLst>
+            <a:ext uri="{909E8E84-426E-40DD-AFC4-6F175D3DCCD1}">
+              <a14:hiddenFill xmlns:a14="http://schemas.microsoft.com/office/drawing/2010/main">
+                <a:solidFill>
+                  <a:schemeClr val="accent1"/>
+                </a:solidFill>
+              </a14:hiddenFill>
+            </a:ext>
+            <a:ext uri="{91240B29-F687-4F45-9708-019B960494DF}">
+              <a14:hiddenLine xmlns:a14="http://schemas.microsoft.com/office/drawing/2010/main" w="9525">
+                <a:solidFill>
+                  <a:schemeClr val="tx1"/>
+                </a:solidFill>
+                <a:miter lim="800000"/>
+                <a:headEnd/>
+                <a:tailEnd/>
+              </a14:hiddenLine>
+            </a:ext>
+            <a:ext uri="{AF507438-7753-43E0-B8FC-AC1667EBCBE1}">
+              <a14:hiddenEffects xmlns:a14="http://schemas.microsoft.com/office/drawing/2010/main">
+                <a:effectLst>
+                  <a:outerShdw dist="35921" dir="2700000" algn="ctr" rotWithShape="0">
+                    <a:schemeClr val="bg2"/>
+                  </a:outerShdw>
+                </a:effectLst>
+              </a14:hiddenEffects>
+            </a:ext>
+          </a:extLst>
+        </p:spPr>
+      </p:pic>
+    </p:spTree>
+    <p:extLst>
+      <p:ext uri="{BB962C8B-B14F-4D97-AF65-F5344CB8AC3E}">
+        <p14:creationId xmlns:p14="http://schemas.microsoft.com/office/powerpoint/2010/main" val="3765411648"/>
+      </p:ext>
+    </p:extLst>
+  </p:cSld>
+  <p:clrMapOvr>
+    <a:masterClrMapping/>
+  </p:clrMapOvr>
+</p:sld>
+</file>
+
+<file path=ppt/slides/slide29.xml><?xml version="1.0" encoding="utf-8"?>
+<p:sld xmlns:a="http://schemas.openxmlformats.org/drawingml/2006/main" xmlns:r="http://schemas.openxmlformats.org/officeDocument/2006/relationships" xmlns:p="http://schemas.openxmlformats.org/presentationml/2006/main">
+  <p:cSld>
+    <p:spTree>
+      <p:nvGrpSpPr>
+        <p:cNvPr id="1" name=""/>
+        <p:cNvGrpSpPr/>
+        <p:nvPr/>
+      </p:nvGrpSpPr>
+      <p:grpSpPr>
+        <a:xfrm>
+          <a:off x="0" y="0"/>
+          <a:ext cx="0" cy="0"/>
+          <a:chOff x="0" y="0"/>
+          <a:chExt cx="0" cy="0"/>
+        </a:xfrm>
+      </p:grpSpPr>
+      <p:sp>
+        <p:nvSpPr>
+          <p:cNvPr id="2" name="Title 1"/>
+          <p:cNvSpPr>
+            <a:spLocks noGrp="1"/>
+          </p:cNvSpPr>
+          <p:nvPr>
+            <p:ph type="title"/>
+          </p:nvPr>
+        </p:nvSpPr>
+        <p:spPr/>
+        <p:txBody>
+          <a:bodyPr/>
+          <a:lstStyle/>
+          <a:p>
+            <a:r>
+              <a:rPr lang="en-US" dirty="0" smtClean="0"/>
+              <a:t>Dissipative structure pattern</a:t>
+            </a:r>
+            <a:endParaRPr lang="en-US" dirty="0"/>
+          </a:p>
+        </p:txBody>
+      </p:sp>
+      <p:sp>
+        <p:nvSpPr>
+          <p:cNvPr id="5" name="Text Placeholder 4"/>
+          <p:cNvSpPr>
+            <a:spLocks noGrp="1"/>
+          </p:cNvSpPr>
+          <p:nvPr>
+            <p:ph type="body" sz="quarter" idx="1"/>
+          </p:nvPr>
+        </p:nvSpPr>
+        <p:spPr/>
+        <p:txBody>
+          <a:bodyPr/>
+          <a:lstStyle/>
+          <a:p>
+            <a:pPr algn="ctr"/>
+            <a:r>
+              <a:rPr lang="en-US" dirty="0" smtClean="0"/>
+              <a:t>X v/s r</a:t>
+            </a:r>
+            <a:endParaRPr lang="en-US" dirty="0"/>
+          </a:p>
+        </p:txBody>
+      </p:sp>
+      <p:sp>
+        <p:nvSpPr>
+          <p:cNvPr id="6" name="Text Placeholder 5"/>
+          <p:cNvSpPr>
+            <a:spLocks noGrp="1"/>
+          </p:cNvSpPr>
+          <p:nvPr>
+            <p:ph type="body" sz="quarter" idx="3"/>
+          </p:nvPr>
+        </p:nvSpPr>
+        <p:spPr/>
+        <p:txBody>
+          <a:bodyPr/>
+          <a:lstStyle/>
+          <a:p>
+            <a:pPr algn="ctr"/>
+            <a:r>
+              <a:rPr lang="en-US" dirty="0" smtClean="0"/>
+              <a:t>Y </a:t>
+            </a:r>
+            <a:r>
+              <a:rPr lang="en-US" dirty="0"/>
+              <a:t>v/s </a:t>
+            </a:r>
+            <a:r>
+              <a:rPr lang="en-US" dirty="0" smtClean="0"/>
+              <a:t>r</a:t>
+            </a:r>
+            <a:endParaRPr lang="en-US" dirty="0"/>
+          </a:p>
+        </p:txBody>
+      </p:sp>
+      <p:pic>
+        <p:nvPicPr>
+          <p:cNvPr id="7" name="Content Placeholder 6"/>
+          <p:cNvPicPr>
+            <a:picLocks noGrp="1"/>
+          </p:cNvPicPr>
+          <p:nvPr>
+            <p:ph sz="quarter" idx="2"/>
+          </p:nvPr>
+        </p:nvPicPr>
+        <p:blipFill>
+          <a:blip r:embed="rId2">
+            <a:extLst>
+              <a:ext uri="{28A0092B-C50C-407E-A947-70E740481C1C}">
+                <a14:useLocalDpi xmlns:a14="http://schemas.microsoft.com/office/drawing/2010/main" val="0"/>
+              </a:ext>
+            </a:extLst>
+          </a:blip>
+          <a:stretch>
+            <a:fillRect/>
+          </a:stretch>
+        </p:blipFill>
+        <p:spPr>
+          <a:xfrm>
+            <a:off x="457200" y="2514600"/>
+            <a:ext cx="3657600" cy="2916000"/>
+          </a:xfrm>
+          <a:prstGeom prst="rect">
+            <a:avLst/>
+          </a:prstGeom>
+        </p:spPr>
+      </p:pic>
+      <p:pic>
+        <p:nvPicPr>
+          <p:cNvPr id="8" name="Content Placeholder 7"/>
+          <p:cNvPicPr>
+            <a:picLocks noGrp="1"/>
+          </p:cNvPicPr>
+          <p:nvPr>
+            <p:ph sz="quarter" idx="4"/>
+          </p:nvPr>
+        </p:nvPicPr>
+        <p:blipFill>
+          <a:blip r:embed="rId3">
+            <a:extLst>
+              <a:ext uri="{28A0092B-C50C-407E-A947-70E740481C1C}">
+                <a14:useLocalDpi xmlns:a14="http://schemas.microsoft.com/office/drawing/2010/main" val="0"/>
+              </a:ext>
+            </a:extLst>
+          </a:blip>
+          <a:stretch>
+            <a:fillRect/>
+          </a:stretch>
+        </p:blipFill>
+        <p:spPr>
+          <a:xfrm>
+            <a:off x="4371975" y="2514600"/>
+            <a:ext cx="3657600" cy="2969971"/>
+          </a:xfrm>
+          <a:prstGeom prst="rect">
+            <a:avLst/>
+          </a:prstGeom>
+        </p:spPr>
+      </p:pic>
+      <p:sp>
+        <p:nvSpPr>
+          <p:cNvPr id="9" name="Rectangle 8"/>
+          <p:cNvSpPr/>
+          <p:nvPr/>
+        </p:nvSpPr>
+        <p:spPr>
+          <a:xfrm>
+            <a:off x="457200" y="5791200"/>
+            <a:ext cx="7543800" cy="584775"/>
+          </a:xfrm>
+          <a:prstGeom prst="rect">
+            <a:avLst/>
+          </a:prstGeom>
+        </p:spPr>
+        <p:txBody>
+          <a:bodyPr wrap="square">
+            <a:spAutoFit/>
+          </a:bodyPr>
+          <a:lstStyle/>
+          <a:p>
+            <a:r>
+              <a:rPr lang="en-US" sz="1600" dirty="0"/>
+              <a:t>Results obtained from the simulation of the above MATLAB code; Matched with the original solution given in figure 5a and 5b in the paper.</a:t>
+            </a:r>
+            <a:endParaRPr lang="en-US" sz="1600" dirty="0"/>
+          </a:p>
+        </p:txBody>
+      </p:sp>
+    </p:spTree>
+    <p:extLst>
+      <p:ext uri="{BB962C8B-B14F-4D97-AF65-F5344CB8AC3E}">
+        <p14:creationId xmlns:p14="http://schemas.microsoft.com/office/powerpoint/2010/main" val="25655341"/>
       </p:ext>
     </p:extLst>
   </p:cSld>
@@ -11633,6 +11993,418 @@
 </p:sld>
 </file>
 
+<file path=ppt/slides/slide30.xml><?xml version="1.0" encoding="utf-8"?>
+<p:sld xmlns:a="http://schemas.openxmlformats.org/drawingml/2006/main" xmlns:r="http://schemas.openxmlformats.org/officeDocument/2006/relationships" xmlns:p="http://schemas.openxmlformats.org/presentationml/2006/main">
+  <p:cSld>
+    <p:spTree>
+      <p:nvGrpSpPr>
+        <p:cNvPr id="1" name=""/>
+        <p:cNvGrpSpPr/>
+        <p:nvPr/>
+      </p:nvGrpSpPr>
+      <p:grpSpPr>
+        <a:xfrm>
+          <a:off x="0" y="0"/>
+          <a:ext cx="0" cy="0"/>
+          <a:chOff x="0" y="0"/>
+          <a:chExt cx="0" cy="0"/>
+        </a:xfrm>
+      </p:grpSpPr>
+      <p:sp>
+        <p:nvSpPr>
+          <p:cNvPr id="2" name="Title 1"/>
+          <p:cNvSpPr>
+            <a:spLocks noGrp="1"/>
+          </p:cNvSpPr>
+          <p:nvPr>
+            <p:ph type="title"/>
+          </p:nvPr>
+        </p:nvSpPr>
+        <p:spPr/>
+        <p:txBody>
+          <a:bodyPr/>
+          <a:lstStyle/>
+          <a:p>
+            <a:r>
+              <a:rPr lang="en-US" dirty="0" smtClean="0"/>
+              <a:t>Pattern from numerical integration of steady state rate equation</a:t>
+            </a:r>
+            <a:endParaRPr lang="en-US" dirty="0"/>
+          </a:p>
+        </p:txBody>
+      </p:sp>
+      <p:sp>
+        <p:nvSpPr>
+          <p:cNvPr id="3" name="Content Placeholder 2"/>
+          <p:cNvSpPr>
+            <a:spLocks noGrp="1"/>
+          </p:cNvSpPr>
+          <p:nvPr>
+            <p:ph sz="quarter" idx="1"/>
+          </p:nvPr>
+        </p:nvSpPr>
+        <p:spPr/>
+        <p:txBody>
+          <a:bodyPr/>
+          <a:lstStyle/>
+          <a:p>
+            <a:r>
+              <a:rPr lang="en-US" dirty="0"/>
+              <a:t>And the pattern obtained from numerical integration of equation 1.2</a:t>
+            </a:r>
+            <a:r>
+              <a:rPr lang="en-US" dirty="0" smtClean="0"/>
+              <a:t>,</a:t>
+            </a:r>
+          </a:p>
+          <a:p>
+            <a:endParaRPr lang="en-US" dirty="0"/>
+          </a:p>
+          <a:p>
+            <a:endParaRPr lang="en-US" dirty="0" smtClean="0"/>
+          </a:p>
+          <a:p>
+            <a:pPr marL="0" indent="0">
+              <a:buNone/>
+            </a:pPr>
+            <a:endParaRPr lang="en-US" dirty="0" smtClean="0"/>
+          </a:p>
+          <a:p>
+            <a:pPr marL="0" indent="0">
+              <a:buNone/>
+            </a:pPr>
+            <a:r>
+              <a:rPr lang="en-US" dirty="0" smtClean="0"/>
+              <a:t>   comes </a:t>
+            </a:r>
+            <a:r>
+              <a:rPr lang="en-US" dirty="0"/>
+              <a:t>out to be as follows:-</a:t>
+            </a:r>
+            <a:endParaRPr lang="en-US" dirty="0" smtClean="0"/>
+          </a:p>
+          <a:p>
+            <a:endParaRPr lang="en-US" dirty="0"/>
+          </a:p>
+        </p:txBody>
+      </p:sp>
+      <p:pic>
+        <p:nvPicPr>
+          <p:cNvPr id="4" name="Picture 3"/>
+          <p:cNvPicPr/>
+          <p:nvPr/>
+        </p:nvPicPr>
+        <p:blipFill>
+          <a:blip r:embed="rId2">
+            <a:extLst>
+              <a:ext uri="{28A0092B-C50C-407E-A947-70E740481C1C}">
+                <a14:useLocalDpi xmlns:a14="http://schemas.microsoft.com/office/drawing/2010/main" val="0"/>
+              </a:ext>
+            </a:extLst>
+          </a:blip>
+          <a:stretch>
+            <a:fillRect/>
+          </a:stretch>
+        </p:blipFill>
+        <p:spPr>
+          <a:xfrm>
+            <a:off x="685800" y="2511380"/>
+            <a:ext cx="7162800" cy="1222420"/>
+          </a:xfrm>
+          <a:prstGeom prst="rect">
+            <a:avLst/>
+          </a:prstGeom>
+        </p:spPr>
+      </p:pic>
+      <p:pic>
+        <p:nvPicPr>
+          <p:cNvPr id="5" name="Picture 4"/>
+          <p:cNvPicPr/>
+          <p:nvPr/>
+        </p:nvPicPr>
+        <p:blipFill>
+          <a:blip r:embed="rId3">
+            <a:extLst>
+              <a:ext uri="{28A0092B-C50C-407E-A947-70E740481C1C}">
+                <a14:useLocalDpi xmlns:a14="http://schemas.microsoft.com/office/drawing/2010/main" val="0"/>
+              </a:ext>
+            </a:extLst>
+          </a:blip>
+          <a:stretch>
+            <a:fillRect/>
+          </a:stretch>
+        </p:blipFill>
+        <p:spPr>
+          <a:xfrm>
+            <a:off x="990600" y="4191000"/>
+            <a:ext cx="2892425" cy="2419350"/>
+          </a:xfrm>
+          <a:prstGeom prst="rect">
+            <a:avLst/>
+          </a:prstGeom>
+        </p:spPr>
+      </p:pic>
+      <p:pic>
+        <p:nvPicPr>
+          <p:cNvPr id="6" name="Picture 5"/>
+          <p:cNvPicPr/>
+          <p:nvPr/>
+        </p:nvPicPr>
+        <p:blipFill>
+          <a:blip r:embed="rId4">
+            <a:extLst>
+              <a:ext uri="{28A0092B-C50C-407E-A947-70E740481C1C}">
+                <a14:useLocalDpi xmlns:a14="http://schemas.microsoft.com/office/drawing/2010/main" val="0"/>
+              </a:ext>
+            </a:extLst>
+          </a:blip>
+          <a:stretch>
+            <a:fillRect/>
+          </a:stretch>
+        </p:blipFill>
+        <p:spPr>
+          <a:xfrm>
+            <a:off x="4648200" y="4154170"/>
+            <a:ext cx="2952750" cy="2456180"/>
+          </a:xfrm>
+          <a:prstGeom prst="rect">
+            <a:avLst/>
+          </a:prstGeom>
+        </p:spPr>
+      </p:pic>
+    </p:spTree>
+    <p:extLst>
+      <p:ext uri="{BB962C8B-B14F-4D97-AF65-F5344CB8AC3E}">
+        <p14:creationId xmlns:p14="http://schemas.microsoft.com/office/powerpoint/2010/main" val="3600853817"/>
+      </p:ext>
+    </p:extLst>
+  </p:cSld>
+  <p:clrMapOvr>
+    <a:masterClrMapping/>
+  </p:clrMapOvr>
+</p:sld>
+</file>
+
+<file path=ppt/slides/slide31.xml><?xml version="1.0" encoding="utf-8"?>
+<p:sld xmlns:a="http://schemas.openxmlformats.org/drawingml/2006/main" xmlns:r="http://schemas.openxmlformats.org/officeDocument/2006/relationships" xmlns:p="http://schemas.openxmlformats.org/presentationml/2006/main">
+  <p:cSld>
+    <p:spTree>
+      <p:nvGrpSpPr>
+        <p:cNvPr id="1" name=""/>
+        <p:cNvGrpSpPr/>
+        <p:nvPr/>
+      </p:nvGrpSpPr>
+      <p:grpSpPr>
+        <a:xfrm>
+          <a:off x="0" y="0"/>
+          <a:ext cx="0" cy="0"/>
+          <a:chOff x="0" y="0"/>
+          <a:chExt cx="0" cy="0"/>
+        </a:xfrm>
+      </p:grpSpPr>
+      <p:sp>
+        <p:nvSpPr>
+          <p:cNvPr id="2" name="Title 1"/>
+          <p:cNvSpPr>
+            <a:spLocks noGrp="1"/>
+          </p:cNvSpPr>
+          <p:nvPr>
+            <p:ph type="title"/>
+          </p:nvPr>
+        </p:nvSpPr>
+        <p:spPr/>
+        <p:txBody>
+          <a:bodyPr/>
+          <a:lstStyle/>
+          <a:p>
+            <a:r>
+              <a:rPr lang="en-US" dirty="0" smtClean="0"/>
+              <a:t>References</a:t>
+            </a:r>
+            <a:endParaRPr lang="en-US" dirty="0"/>
+          </a:p>
+        </p:txBody>
+      </p:sp>
+      <p:sp>
+        <p:nvSpPr>
+          <p:cNvPr id="3" name="Content Placeholder 2"/>
+          <p:cNvSpPr>
+            <a:spLocks noGrp="1"/>
+          </p:cNvSpPr>
+          <p:nvPr>
+            <p:ph sz="quarter" idx="1"/>
+          </p:nvPr>
+        </p:nvSpPr>
+        <p:spPr/>
+        <p:txBody>
+          <a:bodyPr>
+            <a:normAutofit fontScale="92500"/>
+          </a:bodyPr>
+          <a:lstStyle/>
+          <a:p>
+            <a:r>
+              <a:rPr lang="en-US" b="1" dirty="0"/>
+              <a:t>J. F. G. </a:t>
+            </a:r>
+            <a:r>
+              <a:rPr lang="en-US" b="1" dirty="0" err="1"/>
+              <a:t>Auchmuty</a:t>
+            </a:r>
+            <a:r>
+              <a:rPr lang="en-US" b="1" dirty="0"/>
+              <a:t> and </a:t>
+            </a:r>
+            <a:r>
+              <a:rPr lang="en-US" b="1" dirty="0" err="1"/>
+              <a:t>Nicholis</a:t>
+            </a:r>
+            <a:r>
+              <a:rPr lang="en-US" b="1" dirty="0"/>
+              <a:t> G.</a:t>
+            </a:r>
+            <a:r>
+              <a:rPr lang="en-US" dirty="0"/>
+              <a:t> Bifurcation analysis of Nonlinear Reaction-Diffusion Equations - I [Journal]. - [</a:t>
+            </a:r>
+            <a:r>
+              <a:rPr lang="en-US" dirty="0" err="1"/>
+              <a:t>s.l</a:t>
+            </a:r>
+            <a:r>
+              <a:rPr lang="en-US" dirty="0"/>
+              <a:t>.] : Bull. Math. Biology, 1974. - Vol. 37</a:t>
+            </a:r>
+            <a:r>
+              <a:rPr lang="en-US" dirty="0" smtClean="0"/>
+              <a:t>.</a:t>
+            </a:r>
+            <a:endParaRPr lang="en-US" dirty="0"/>
+          </a:p>
+          <a:p>
+            <a:r>
+              <a:rPr lang="en-US" b="1" dirty="0"/>
+              <a:t>Kaufman M. Herschkowitz</a:t>
+            </a:r>
+            <a:r>
+              <a:rPr lang="en-US" dirty="0"/>
+              <a:t> Bifurcation analysis of non-linear reaction-diffusion equations - II [Journal]. - Belgium : [</a:t>
+            </a:r>
+            <a:r>
+              <a:rPr lang="en-US" dirty="0" err="1"/>
+              <a:t>s.n</a:t>
+            </a:r>
+            <a:r>
+              <a:rPr lang="en-US" dirty="0"/>
+              <a:t>.], 1975. - Vol. 37.</a:t>
+            </a:r>
+          </a:p>
+          <a:p>
+            <a:r>
+              <a:rPr lang="en-US" b="1" dirty="0"/>
+              <a:t>Murray J. D.</a:t>
+            </a:r>
+            <a:r>
+              <a:rPr lang="en-US" dirty="0"/>
+              <a:t> Mathematical Biology [Book]. - Vol. II.</a:t>
+            </a:r>
+          </a:p>
+          <a:p>
+            <a:r>
+              <a:rPr lang="en-US" b="1" dirty="0"/>
+              <a:t>Solving Initial-Boundary value problems for parabolic-elliptic PDEs in 1-D</a:t>
+            </a:r>
+            <a:r>
+              <a:rPr lang="en-US" dirty="0"/>
+              <a:t> [Online] // </a:t>
+            </a:r>
+            <a:r>
+              <a:rPr lang="en-US" dirty="0" err="1"/>
+              <a:t>Mathworks</a:t>
+            </a:r>
+            <a:r>
+              <a:rPr lang="en-US" dirty="0"/>
+              <a:t> India. - http://in.mathworks.com/help/matlab/ref/pdepe.html</a:t>
+            </a:r>
+            <a:r>
+              <a:rPr lang="en-US" dirty="0" smtClean="0"/>
+              <a:t>.</a:t>
+            </a:r>
+            <a:endParaRPr lang="en-US" dirty="0"/>
+          </a:p>
+        </p:txBody>
+      </p:sp>
+    </p:spTree>
+    <p:extLst>
+      <p:ext uri="{BB962C8B-B14F-4D97-AF65-F5344CB8AC3E}">
+        <p14:creationId xmlns:p14="http://schemas.microsoft.com/office/powerpoint/2010/main" val="1588986807"/>
+      </p:ext>
+    </p:extLst>
+  </p:cSld>
+  <p:clrMapOvr>
+    <a:masterClrMapping/>
+  </p:clrMapOvr>
+</p:sld>
+</file>
+
+<file path=ppt/slides/slide32.xml><?xml version="1.0" encoding="utf-8"?>
+<p:sld xmlns:a="http://schemas.openxmlformats.org/drawingml/2006/main" xmlns:r="http://schemas.openxmlformats.org/officeDocument/2006/relationships" xmlns:p="http://schemas.openxmlformats.org/presentationml/2006/main">
+  <p:cSld>
+    <p:spTree>
+      <p:nvGrpSpPr>
+        <p:cNvPr id="1" name=""/>
+        <p:cNvGrpSpPr/>
+        <p:nvPr/>
+      </p:nvGrpSpPr>
+      <p:grpSpPr>
+        <a:xfrm>
+          <a:off x="0" y="0"/>
+          <a:ext cx="0" cy="0"/>
+          <a:chOff x="0" y="0"/>
+          <a:chExt cx="0" cy="0"/>
+        </a:xfrm>
+      </p:grpSpPr>
+      <p:sp>
+        <p:nvSpPr>
+          <p:cNvPr id="2" name="Title 1"/>
+          <p:cNvSpPr>
+            <a:spLocks noGrp="1"/>
+          </p:cNvSpPr>
+          <p:nvPr>
+            <p:ph type="title"/>
+          </p:nvPr>
+        </p:nvSpPr>
+        <p:spPr>
+          <a:xfrm>
+            <a:off x="457200" y="2590800"/>
+            <a:ext cx="7467600" cy="1143000"/>
+          </a:xfrm>
+        </p:spPr>
+        <p:txBody>
+          <a:bodyPr/>
+          <a:lstStyle/>
+          <a:p>
+            <a:pPr algn="ctr"/>
+            <a:r>
+              <a:rPr lang="en-US" dirty="0" smtClean="0"/>
+              <a:t>Thank You</a:t>
+            </a:r>
+            <a:endParaRPr lang="en-US" dirty="0"/>
+          </a:p>
+        </p:txBody>
+      </p:sp>
+    </p:spTree>
+    <p:extLst>
+      <p:ext uri="{BB962C8B-B14F-4D97-AF65-F5344CB8AC3E}">
+        <p14:creationId xmlns:p14="http://schemas.microsoft.com/office/powerpoint/2010/main" val="1753446294"/>
+      </p:ext>
+    </p:extLst>
+  </p:cSld>
+  <p:clrMapOvr>
+    <a:masterClrMapping/>
+  </p:clrMapOvr>
+</p:sld>
+</file>
+
 <file path=ppt/slides/slide4.xml><?xml version="1.0" encoding="utf-8"?>
 <p:sld xmlns:a="http://schemas.openxmlformats.org/drawingml/2006/main" xmlns:r="http://schemas.openxmlformats.org/officeDocument/2006/relationships" xmlns:p="http://schemas.openxmlformats.org/presentationml/2006/main">
   <p:cSld>
@@ -11749,7 +12521,6 @@
               <a:rPr lang="en-US" dirty="0"/>
               <a:t>is  introduced  by  the  auto-  and  cross-catalytic  steps  (b) and  (c);</a:t>
             </a:r>
-            <a:endParaRPr lang="en-US" dirty="0"/>
           </a:p>
         </p:txBody>
       </p:sp>

</xml_diff>